<commit_message>
added lecture notes for Tue 11/5/19
</commit_message>
<xml_diff>
--- a/Lecture/CSE 4361 Lecture 17 Thu 10-31-19.pptx
+++ b/Lecture/CSE 4361 Lecture 17 Thu 10-31-19.pptx
@@ -108,6 +108,11 @@
       </a:defRPr>
     </a:lvl9pPr>
   </p:defaultTextStyle>
+  <p:extLst>
+    <p:ext uri="{EFAFB233-063F-42B5-8137-9DF3F51BA10A}">
+      <p15:sldGuideLst xmlns:p15="http://schemas.microsoft.com/office/powerpoint/2012/main"/>
+    </p:ext>
+  </p:extLst>
 </p:presentation>
 </file>
 
@@ -242,7 +247,7 @@
           <a:p>
             <a:fld id="{E93C676C-EDB7-4FED-873C-4D2149351748}" type="datetimeFigureOut">
               <a:rPr lang="en-US" smtClean="0"/>
-              <a:t>10/31/2019</a:t>
+              <a:t>11/5/2019</a:t>
             </a:fld>
             <a:endParaRPr lang="en-US"/>
           </a:p>
@@ -412,7 +417,7 @@
           <a:p>
             <a:fld id="{E93C676C-EDB7-4FED-873C-4D2149351748}" type="datetimeFigureOut">
               <a:rPr lang="en-US" smtClean="0"/>
-              <a:t>10/31/2019</a:t>
+              <a:t>11/5/2019</a:t>
             </a:fld>
             <a:endParaRPr lang="en-US"/>
           </a:p>
@@ -592,7 +597,7 @@
           <a:p>
             <a:fld id="{E93C676C-EDB7-4FED-873C-4D2149351748}" type="datetimeFigureOut">
               <a:rPr lang="en-US" smtClean="0"/>
-              <a:t>10/31/2019</a:t>
+              <a:t>11/5/2019</a:t>
             </a:fld>
             <a:endParaRPr lang="en-US"/>
           </a:p>
@@ -762,7 +767,7 @@
           <a:p>
             <a:fld id="{E93C676C-EDB7-4FED-873C-4D2149351748}" type="datetimeFigureOut">
               <a:rPr lang="en-US" smtClean="0"/>
-              <a:t>10/31/2019</a:t>
+              <a:t>11/5/2019</a:t>
             </a:fld>
             <a:endParaRPr lang="en-US"/>
           </a:p>
@@ -1006,7 +1011,7 @@
           <a:p>
             <a:fld id="{E93C676C-EDB7-4FED-873C-4D2149351748}" type="datetimeFigureOut">
               <a:rPr lang="en-US" smtClean="0"/>
-              <a:t>10/31/2019</a:t>
+              <a:t>11/5/2019</a:t>
             </a:fld>
             <a:endParaRPr lang="en-US"/>
           </a:p>
@@ -1238,7 +1243,7 @@
           <a:p>
             <a:fld id="{E93C676C-EDB7-4FED-873C-4D2149351748}" type="datetimeFigureOut">
               <a:rPr lang="en-US" smtClean="0"/>
-              <a:t>10/31/2019</a:t>
+              <a:t>11/5/2019</a:t>
             </a:fld>
             <a:endParaRPr lang="en-US"/>
           </a:p>
@@ -1605,7 +1610,7 @@
           <a:p>
             <a:fld id="{E93C676C-EDB7-4FED-873C-4D2149351748}" type="datetimeFigureOut">
               <a:rPr lang="en-US" smtClean="0"/>
-              <a:t>10/31/2019</a:t>
+              <a:t>11/5/2019</a:t>
             </a:fld>
             <a:endParaRPr lang="en-US"/>
           </a:p>
@@ -1723,7 +1728,7 @@
           <a:p>
             <a:fld id="{E93C676C-EDB7-4FED-873C-4D2149351748}" type="datetimeFigureOut">
               <a:rPr lang="en-US" smtClean="0"/>
-              <a:t>10/31/2019</a:t>
+              <a:t>11/5/2019</a:t>
             </a:fld>
             <a:endParaRPr lang="en-US"/>
           </a:p>
@@ -1818,7 +1823,7 @@
           <a:p>
             <a:fld id="{E93C676C-EDB7-4FED-873C-4D2149351748}" type="datetimeFigureOut">
               <a:rPr lang="en-US" smtClean="0"/>
-              <a:t>10/31/2019</a:t>
+              <a:t>11/5/2019</a:t>
             </a:fld>
             <a:endParaRPr lang="en-US"/>
           </a:p>
@@ -2095,7 +2100,7 @@
           <a:p>
             <a:fld id="{E93C676C-EDB7-4FED-873C-4D2149351748}" type="datetimeFigureOut">
               <a:rPr lang="en-US" smtClean="0"/>
-              <a:t>10/31/2019</a:t>
+              <a:t>11/5/2019</a:t>
             </a:fld>
             <a:endParaRPr lang="en-US"/>
           </a:p>
@@ -2352,7 +2357,7 @@
           <a:p>
             <a:fld id="{E93C676C-EDB7-4FED-873C-4D2149351748}" type="datetimeFigureOut">
               <a:rPr lang="en-US" smtClean="0"/>
-              <a:t>10/31/2019</a:t>
+              <a:t>11/5/2019</a:t>
             </a:fld>
             <a:endParaRPr lang="en-US"/>
           </a:p>
@@ -2565,7 +2570,7 @@
           <a:p>
             <a:fld id="{E93C676C-EDB7-4FED-873C-4D2149351748}" type="datetimeFigureOut">
               <a:rPr lang="en-US" smtClean="0"/>
-              <a:t>10/31/2019</a:t>
+              <a:t>11/5/2019</a:t>
             </a:fld>
             <a:endParaRPr lang="en-US"/>
           </a:p>
@@ -2993,7 +2998,7 @@
           <a:p>
             <a:r>
               <a:rPr lang="en-US" dirty="0"/>
-              <a:t>CSE 4361 Lecture 17</a:t>
+              <a:t>CSE 4361 Lecture 18</a:t>
             </a:r>
           </a:p>
         </p:txBody>

</xml_diff>